<commit_message>
making the app factory bigger.
git-svn-id: https://rhino-tools.svn.sourceforge.net/svnroot/rhino-tools/trunk@621 079b0acf-d9fa-0310-9935-e5ade295c882
</commit_message>
<xml_diff>
--- a/SampleApplications/Course/Docs/The library application.pptx
+++ b/SampleApplications/Course/Docs/The library application.pptx
@@ -4337,6 +4337,7 @@
           <a:p>
             <a:fld id="{77D1101E-F82E-4443-BE6D-B3E824D4AF89}" type="datetimeFigureOut">
               <a:rPr lang="en-US" smtClean="0"/>
+              <a:pPr/>
               <a:t>6/7/2007</a:t>
             </a:fld>
             <a:endParaRPr lang="en-US"/>
@@ -4360,6 +4361,7 @@
           <a:p>
             <a:fld id="{D257E670-88E1-4CB1-B26E-A76E3FB8AA4A}" type="slidenum">
               <a:rPr lang="en-US" smtClean="0"/>
+              <a:pPr/>
               <a:t>‹#›</a:t>
             </a:fld>
             <a:endParaRPr lang="en-US"/>
@@ -4502,6 +4504,7 @@
           <a:p>
             <a:fld id="{77D1101E-F82E-4443-BE6D-B3E824D4AF89}" type="datetimeFigureOut">
               <a:rPr lang="en-US" smtClean="0"/>
+              <a:pPr/>
               <a:t>6/7/2007</a:t>
             </a:fld>
             <a:endParaRPr lang="en-US"/>
@@ -4544,6 +4547,7 @@
           <a:p>
             <a:fld id="{D257E670-88E1-4CB1-B26E-A76E3FB8AA4A}" type="slidenum">
               <a:rPr lang="en-US" smtClean="0"/>
+              <a:pPr/>
               <a:t>‹#›</a:t>
             </a:fld>
             <a:endParaRPr lang="en-US"/>
@@ -4677,6 +4681,7 @@
           <a:p>
             <a:fld id="{77D1101E-F82E-4443-BE6D-B3E824D4AF89}" type="datetimeFigureOut">
               <a:rPr lang="en-US" smtClean="0"/>
+              <a:pPr/>
               <a:t>6/7/2007</a:t>
             </a:fld>
             <a:endParaRPr lang="en-US"/>
@@ -4719,6 +4724,7 @@
           <a:p>
             <a:fld id="{D257E670-88E1-4CB1-B26E-A76E3FB8AA4A}" type="slidenum">
               <a:rPr lang="en-US" smtClean="0"/>
+              <a:pPr/>
               <a:t>‹#›</a:t>
             </a:fld>
             <a:endParaRPr lang="en-US"/>
@@ -4824,6 +4830,7 @@
           <a:p>
             <a:fld id="{77D1101E-F82E-4443-BE6D-B3E824D4AF89}" type="datetimeFigureOut">
               <a:rPr lang="en-US" smtClean="0"/>
+              <a:pPr/>
               <a:t>6/7/2007</a:t>
             </a:fld>
             <a:endParaRPr lang="en-US"/>
@@ -4851,6 +4858,7 @@
           <a:p>
             <a:fld id="{D257E670-88E1-4CB1-B26E-A76E3FB8AA4A}" type="slidenum">
               <a:rPr lang="en-US" smtClean="0"/>
+              <a:pPr/>
               <a:t>‹#›</a:t>
             </a:fld>
             <a:endParaRPr lang="en-US"/>
@@ -4941,6 +4949,7 @@
           <a:p>
             <a:fld id="{77D1101E-F82E-4443-BE6D-B3E824D4AF89}" type="datetimeFigureOut">
               <a:rPr lang="en-US" smtClean="0"/>
+              <a:pPr/>
               <a:t>6/7/2007</a:t>
             </a:fld>
             <a:endParaRPr lang="en-US"/>
@@ -4983,6 +4992,7 @@
           <a:p>
             <a:fld id="{D257E670-88E1-4CB1-B26E-A76E3FB8AA4A}" type="slidenum">
               <a:rPr lang="en-US" smtClean="0"/>
+              <a:pPr/>
               <a:t>‹#›</a:t>
             </a:fld>
             <a:endParaRPr lang="en-US"/>
@@ -5211,6 +5221,7 @@
           <a:p>
             <a:fld id="{77D1101E-F82E-4443-BE6D-B3E824D4AF89}" type="datetimeFigureOut">
               <a:rPr lang="en-US" smtClean="0"/>
+              <a:pPr/>
               <a:t>6/7/2007</a:t>
             </a:fld>
             <a:endParaRPr lang="en-US"/>
@@ -5253,6 +5264,7 @@
           <a:p>
             <a:fld id="{D257E670-88E1-4CB1-B26E-A76E3FB8AA4A}" type="slidenum">
               <a:rPr lang="en-US" smtClean="0"/>
+              <a:pPr/>
               <a:t>‹#›</a:t>
             </a:fld>
             <a:endParaRPr lang="en-US"/>
@@ -5438,6 +5450,7 @@
           <a:p>
             <a:fld id="{D257E670-88E1-4CB1-B26E-A76E3FB8AA4A}" type="slidenum">
               <a:rPr lang="en-US" smtClean="0"/>
+              <a:pPr/>
               <a:t>‹#›</a:t>
             </a:fld>
             <a:endParaRPr lang="en-US"/>
@@ -5480,6 +5493,7 @@
           <a:p>
             <a:fld id="{77D1101E-F82E-4443-BE6D-B3E824D4AF89}" type="datetimeFigureOut">
               <a:rPr lang="en-US" smtClean="0"/>
+              <a:pPr/>
               <a:t>6/7/2007</a:t>
             </a:fld>
             <a:endParaRPr lang="en-US"/>
@@ -5927,6 +5941,7 @@
           <a:p>
             <a:fld id="{77D1101E-F82E-4443-BE6D-B3E824D4AF89}" type="datetimeFigureOut">
               <a:rPr lang="en-US" smtClean="0"/>
+              <a:pPr/>
               <a:t>6/7/2007</a:t>
             </a:fld>
             <a:endParaRPr lang="en-US"/>
@@ -5969,6 +5984,7 @@
           <a:p>
             <a:fld id="{D257E670-88E1-4CB1-B26E-A76E3FB8AA4A}" type="slidenum">
               <a:rPr lang="en-US" smtClean="0"/>
+              <a:pPr/>
               <a:t>‹#›</a:t>
             </a:fld>
             <a:endParaRPr lang="en-US"/>
@@ -6040,6 +6056,7 @@
           <a:p>
             <a:fld id="{77D1101E-F82E-4443-BE6D-B3E824D4AF89}" type="datetimeFigureOut">
               <a:rPr lang="en-US" smtClean="0"/>
+              <a:pPr/>
               <a:t>6/7/2007</a:t>
             </a:fld>
             <a:endParaRPr lang="en-US"/>
@@ -6082,6 +6099,7 @@
           <a:p>
             <a:fld id="{D257E670-88E1-4CB1-B26E-A76E3FB8AA4A}" type="slidenum">
               <a:rPr lang="en-US" smtClean="0"/>
+              <a:pPr/>
               <a:t>‹#›</a:t>
             </a:fld>
             <a:endParaRPr lang="en-US"/>
@@ -6290,6 +6308,7 @@
           <a:p>
             <a:fld id="{77D1101E-F82E-4443-BE6D-B3E824D4AF89}" type="datetimeFigureOut">
               <a:rPr lang="en-US" smtClean="0"/>
+              <a:pPr/>
               <a:t>6/7/2007</a:t>
             </a:fld>
             <a:endParaRPr lang="en-US"/>
@@ -6313,6 +6332,7 @@
           <a:p>
             <a:fld id="{D257E670-88E1-4CB1-B26E-A76E3FB8AA4A}" type="slidenum">
               <a:rPr lang="en-US" smtClean="0"/>
+              <a:pPr/>
               <a:t>‹#›</a:t>
             </a:fld>
             <a:endParaRPr lang="en-US"/>
@@ -6530,6 +6550,7 @@
           <a:p>
             <a:fld id="{77D1101E-F82E-4443-BE6D-B3E824D4AF89}" type="datetimeFigureOut">
               <a:rPr lang="en-US" smtClean="0"/>
+              <a:pPr/>
               <a:t>6/7/2007</a:t>
             </a:fld>
             <a:endParaRPr lang="en-US"/>
@@ -6553,6 +6574,7 @@
           <a:p>
             <a:fld id="{D257E670-88E1-4CB1-B26E-A76E3FB8AA4A}" type="slidenum">
               <a:rPr lang="en-US" smtClean="0"/>
+              <a:pPr/>
               <a:t>‹#›</a:t>
             </a:fld>
             <a:endParaRPr lang="en-US"/>
@@ -6703,6 +6725,7 @@
           <a:p>
             <a:fld id="{77D1101E-F82E-4443-BE6D-B3E824D4AF89}" type="datetimeFigureOut">
               <a:rPr lang="en-US" smtClean="0"/>
+              <a:pPr/>
               <a:t>6/7/2007</a:t>
             </a:fld>
             <a:endParaRPr lang="en-US"/>
@@ -6780,6 +6803,7 @@
           <a:p>
             <a:fld id="{D257E670-88E1-4CB1-B26E-A76E3FB8AA4A}" type="slidenum">
               <a:rPr lang="en-US" smtClean="0"/>
+              <a:pPr/>
               <a:t>‹#›</a:t>
             </a:fld>
             <a:endParaRPr lang="en-US"/>
@@ -7539,6 +7563,13 @@
   <p:clrMapOvr>
     <a:masterClrMapping/>
   </p:clrMapOvr>
+  <p:timing>
+    <p:tnLst>
+      <p:par>
+        <p:cTn id="1" dur="indefinite" restart="never" nodeType="tmRoot"/>
+      </p:par>
+    </p:tnLst>
+  </p:timing>
 </p:sld>
 </file>
 
@@ -7902,11 +7933,7 @@
             </a:br>
             <a:r>
               <a:rPr b="1" i="1" smtClean="0"/>
-              <a:t>The </a:t>
-            </a:r>
-            <a:r>
-              <a:rPr b="1" i="1" smtClean="0"/>
-              <a:t>database</a:t>
+              <a:t>The database</a:t>
             </a:r>
             <a:endParaRPr lang="en-US" dirty="0"/>
           </a:p>
@@ -8212,11 +8239,7 @@
           <a:p>
             <a:r>
               <a:rPr b="1" i="1" smtClean="0"/>
-              <a:t>The </a:t>
-            </a:r>
-            <a:r>
-              <a:rPr b="1" i="1" smtClean="0"/>
-              <a:t>services</a:t>
+              <a:t>The services</a:t>
             </a:r>
             <a:endParaRPr lang="en-US" dirty="0"/>
           </a:p>
@@ -8379,11 +8402,7 @@
             </a:br>
             <a:r>
               <a:rPr b="1" i="1" smtClean="0"/>
-              <a:t>The </a:t>
-            </a:r>
-            <a:r>
-              <a:rPr b="1" i="1" smtClean="0"/>
-              <a:t>Controllers</a:t>
+              <a:t>The Controllers</a:t>
             </a:r>
             <a:endParaRPr lang="en-US" dirty="0"/>
           </a:p>
@@ -8603,24 +8622,36 @@
         </p:blipFill>
         <p:spPr bwMode="auto">
           <a:xfrm>
-            <a:off x="2285984" y="2143116"/>
-            <a:ext cx="4219598" cy="3710007"/>
+            <a:off x="928662" y="1357298"/>
+            <a:ext cx="7286676" cy="5000660"/>
           </a:xfrm>
-          <a:prstGeom prst="rect">
-            <a:avLst/>
+          <a:prstGeom prst="roundRect">
+            <a:avLst>
+              <a:gd name="adj" fmla="val 16667"/>
+            </a:avLst>
           </a:prstGeom>
-          <a:ln w="228600" cap="sq" cmpd="thickThin">
-            <a:solidFill>
-              <a:srgbClr val="000000"/>
-            </a:solidFill>
-            <a:prstDash val="solid"/>
-            <a:miter lim="800000"/>
+          <a:ln>
+            <a:noFill/>
           </a:ln>
           <a:effectLst>
-            <a:innerShdw blurRad="76200">
-              <a:srgbClr val="000000"/>
-            </a:innerShdw>
+            <a:outerShdw blurRad="50800" dist="38100" dir="18900000" algn="bl" rotWithShape="0">
+              <a:prstClr val="black">
+                <a:alpha val="40000"/>
+              </a:prstClr>
+            </a:outerShdw>
           </a:effectLst>
+          <a:scene3d>
+            <a:camera prst="perspectiveRelaxed">
+              <a:rot lat="19800000" lon="1200000" rev="20820000"/>
+            </a:camera>
+            <a:lightRig rig="threePt" dir="t"/>
+          </a:scene3d>
+          <a:sp3d contourW="6350" prstMaterial="matte">
+            <a:bevelT w="101600" h="101600"/>
+            <a:contourClr>
+              <a:srgbClr val="969696"/>
+            </a:contourClr>
+          </a:sp3d>
         </p:spPr>
       </p:pic>
     </p:spTree>

</xml_diff>